<commit_message>
Include AppStore to branches image
</commit_message>
<xml_diff>
--- a/images/Images.pptx
+++ b/images/Images.pptx
@@ -3356,7 +3356,7 @@
         </p:nvSpPr>
         <p:spPr>
           <a:xfrm>
-            <a:off x="865340" y="4327742"/>
+            <a:off x="814540" y="5343742"/>
             <a:ext cx="3632548" cy="926926"/>
           </a:xfrm>
           <a:prstGeom prst="rect">
@@ -3415,7 +3415,7 @@
         </p:nvGrpSpPr>
         <p:grpSpPr>
           <a:xfrm>
-            <a:off x="7389312" y="4175342"/>
+            <a:off x="7338512" y="5191342"/>
             <a:ext cx="3937348" cy="1231726"/>
             <a:chOff x="7389314" y="4137764"/>
             <a:chExt cx="3937348" cy="1231726"/>
@@ -3609,7 +3609,7 @@
         </p:nvCxnSpPr>
         <p:spPr>
           <a:xfrm flipH="1">
-            <a:off x="4497888" y="4638805"/>
+            <a:off x="4447088" y="5654805"/>
             <a:ext cx="2891424" cy="152400"/>
           </a:xfrm>
           <a:prstGeom prst="straightConnector1">
@@ -3655,7 +3655,7 @@
         </p:nvCxnSpPr>
         <p:spPr>
           <a:xfrm flipH="1">
-            <a:off x="4497888" y="4791205"/>
+            <a:off x="4447088" y="5807205"/>
             <a:ext cx="3043824" cy="0"/>
           </a:xfrm>
           <a:prstGeom prst="straightConnector1">
@@ -3701,7 +3701,7 @@
         </p:nvCxnSpPr>
         <p:spPr>
           <a:xfrm flipH="1" flipV="1">
-            <a:off x="4497888" y="4791205"/>
+            <a:off x="4447088" y="5807205"/>
             <a:ext cx="3196224" cy="152400"/>
           </a:xfrm>
           <a:prstGeom prst="straightConnector1">
@@ -3743,7 +3743,7 @@
         </p:nvSpPr>
         <p:spPr>
           <a:xfrm>
-            <a:off x="5754342" y="4943605"/>
+            <a:off x="5703542" y="5959605"/>
             <a:ext cx="530915" cy="369332"/>
           </a:xfrm>
           <a:prstGeom prst="rect">
@@ -3778,7 +3778,7 @@
         </p:nvSpPr>
         <p:spPr>
           <a:xfrm>
-            <a:off x="865340" y="1450932"/>
+            <a:off x="814540" y="2466932"/>
             <a:ext cx="3632548" cy="926926"/>
           </a:xfrm>
           <a:prstGeom prst="rect">
@@ -3837,7 +3837,7 @@
         </p:nvGrpSpPr>
         <p:grpSpPr>
           <a:xfrm>
-            <a:off x="7389312" y="1298532"/>
+            <a:off x="7338512" y="2314532"/>
             <a:ext cx="3937348" cy="1231726"/>
             <a:chOff x="7389314" y="4137764"/>
             <a:chExt cx="3937348" cy="1231726"/>
@@ -4031,7 +4031,7 @@
         </p:nvCxnSpPr>
         <p:spPr>
           <a:xfrm flipH="1">
-            <a:off x="4497888" y="1761995"/>
+            <a:off x="4447088" y="2777995"/>
             <a:ext cx="2891424" cy="152400"/>
           </a:xfrm>
           <a:prstGeom prst="straightConnector1">
@@ -4077,7 +4077,7 @@
         </p:nvCxnSpPr>
         <p:spPr>
           <a:xfrm flipH="1">
-            <a:off x="4497888" y="1914395"/>
+            <a:off x="4447088" y="2930395"/>
             <a:ext cx="3043824" cy="0"/>
           </a:xfrm>
           <a:prstGeom prst="straightConnector1">
@@ -4123,7 +4123,7 @@
         </p:nvCxnSpPr>
         <p:spPr>
           <a:xfrm flipH="1" flipV="1">
-            <a:off x="4497888" y="1914395"/>
+            <a:off x="4447088" y="2930395"/>
             <a:ext cx="3196224" cy="152400"/>
           </a:xfrm>
           <a:prstGeom prst="straightConnector1">
@@ -4165,7 +4165,7 @@
         </p:nvSpPr>
         <p:spPr>
           <a:xfrm>
-            <a:off x="5754342" y="2066795"/>
+            <a:off x="5703542" y="3082795"/>
             <a:ext cx="530915" cy="369332"/>
           </a:xfrm>
           <a:prstGeom prst="rect">
@@ -4204,7 +4204,7 @@
         </p:nvCxnSpPr>
         <p:spPr>
           <a:xfrm flipV="1">
-            <a:off x="2681614" y="2530258"/>
+            <a:off x="2630814" y="3546258"/>
             <a:ext cx="6828772" cy="1797484"/>
           </a:xfrm>
           <a:prstGeom prst="straightConnector1">
@@ -4246,7 +4246,7 @@
         </p:nvSpPr>
         <p:spPr>
           <a:xfrm>
-            <a:off x="5735965" y="3429000"/>
+            <a:off x="5685165" y="4445000"/>
             <a:ext cx="720069" cy="369332"/>
           </a:xfrm>
           <a:prstGeom prst="rect">
@@ -4263,6 +4263,146 @@
             <a:r>
               <a:rPr lang="en-US" dirty="0"/>
               <a:t>Clone</a:t>
+            </a:r>
+          </a:p>
+        </p:txBody>
+      </p:sp>
+      <p:sp>
+        <p:nvSpPr>
+          <p:cNvPr id="34" name="Rectangle 33">
+            <a:extLst>
+              <a:ext uri="{FF2B5EF4-FFF2-40B4-BE49-F238E27FC236}">
+                <a16:creationId xmlns:a16="http://schemas.microsoft.com/office/drawing/2014/main" id="{FE376F52-4D36-3141-A360-22E7A48AFAA9}"/>
+              </a:ext>
+            </a:extLst>
+          </p:cNvPr>
+          <p:cNvSpPr/>
+          <p:nvPr/>
+        </p:nvSpPr>
+        <p:spPr>
+          <a:xfrm>
+            <a:off x="4279726" y="379980"/>
+            <a:ext cx="3632548" cy="926926"/>
+          </a:xfrm>
+          <a:prstGeom prst="rect">
+            <a:avLst/>
+          </a:prstGeom>
+          <a:solidFill>
+            <a:schemeClr val="accent1">
+              <a:lumMod val="75000"/>
+            </a:schemeClr>
+          </a:solidFill>
+          <a:ln>
+            <a:solidFill>
+              <a:schemeClr val="bg1"/>
+            </a:solidFill>
+          </a:ln>
+        </p:spPr>
+        <p:style>
+          <a:lnRef idx="2">
+            <a:schemeClr val="accent1">
+              <a:shade val="50000"/>
+            </a:schemeClr>
+          </a:lnRef>
+          <a:fillRef idx="1">
+            <a:schemeClr val="accent1"/>
+          </a:fillRef>
+          <a:effectRef idx="0">
+            <a:schemeClr val="accent1"/>
+          </a:effectRef>
+          <a:fontRef idx="minor">
+            <a:schemeClr val="lt1"/>
+          </a:fontRef>
+        </p:style>
+        <p:txBody>
+          <a:bodyPr rtlCol="0" anchor="ctr"/>
+          <a:lstStyle/>
+          <a:p>
+            <a:pPr algn="ctr"/>
+            <a:r>
+              <a:rPr lang="en-US" dirty="0"/>
+              <a:t>AppStore</a:t>
+            </a:r>
+          </a:p>
+        </p:txBody>
+      </p:sp>
+      <p:cxnSp>
+        <p:nvCxnSpPr>
+          <p:cNvPr id="35" name="Straight Arrow Connector 34">
+            <a:extLst>
+              <a:ext uri="{FF2B5EF4-FFF2-40B4-BE49-F238E27FC236}">
+                <a16:creationId xmlns:a16="http://schemas.microsoft.com/office/drawing/2014/main" id="{9FD50E58-C28F-8941-B7AE-EF08AE009631}"/>
+              </a:ext>
+            </a:extLst>
+          </p:cNvPr>
+          <p:cNvCxnSpPr>
+            <a:cxnSpLocks/>
+            <a:stCxn id="21" idx="0"/>
+            <a:endCxn id="34" idx="2"/>
+          </p:cNvCxnSpPr>
+          <p:nvPr/>
+        </p:nvCxnSpPr>
+        <p:spPr>
+          <a:xfrm flipV="1">
+            <a:off x="2630814" y="1306906"/>
+            <a:ext cx="3465186" cy="1160026"/>
+          </a:xfrm>
+          <a:prstGeom prst="straightConnector1">
+            <a:avLst/>
+          </a:prstGeom>
+          <a:ln w="25400">
+            <a:solidFill>
+              <a:srgbClr val="C00000"/>
+            </a:solidFill>
+            <a:tailEnd type="stealth" w="lg" len="lg"/>
+          </a:ln>
+        </p:spPr>
+        <p:style>
+          <a:lnRef idx="1">
+            <a:schemeClr val="accent1"/>
+          </a:lnRef>
+          <a:fillRef idx="0">
+            <a:schemeClr val="accent1"/>
+          </a:fillRef>
+          <a:effectRef idx="0">
+            <a:schemeClr val="accent1"/>
+          </a:effectRef>
+          <a:fontRef idx="minor">
+            <a:schemeClr val="tx1"/>
+          </a:fontRef>
+        </p:style>
+      </p:cxnSp>
+      <p:sp>
+        <p:nvSpPr>
+          <p:cNvPr id="38" name="TextBox 37">
+            <a:extLst>
+              <a:ext uri="{FF2B5EF4-FFF2-40B4-BE49-F238E27FC236}">
+                <a16:creationId xmlns:a16="http://schemas.microsoft.com/office/drawing/2014/main" id="{E375B97B-8A21-9A4C-B3B2-D37334DC2438}"/>
+              </a:ext>
+            </a:extLst>
+          </p:cNvPr>
+          <p:cNvSpPr txBox="1"/>
+          <p:nvPr/>
+        </p:nvSpPr>
+        <p:spPr>
+          <a:xfrm>
+            <a:off x="4317041" y="1742185"/>
+            <a:ext cx="842282" cy="369332"/>
+          </a:xfrm>
+          <a:prstGeom prst="rect">
+            <a:avLst/>
+          </a:prstGeom>
+          <a:noFill/>
+        </p:spPr>
+        <p:txBody>
+          <a:bodyPr wrap="none" rtlCol="0">
+            <a:spAutoFit/>
+          </a:bodyPr>
+          <a:lstStyle/>
+          <a:p>
+            <a:r>
+              <a:rPr lang="en-US" dirty="0"/>
+              <a:t>Deploy</a:t>
             </a:r>
           </a:p>
         </p:txBody>

</xml_diff>

<commit_message>
Added storyboard to readme
</commit_message>
<xml_diff>
--- a/images/Images.pptx
+++ b/images/Images.pptx
@@ -6,6 +6,7 @@
   </p:sldMasterIdLst>
   <p:sldIdLst>
     <p:sldId id="256" r:id="rId2"/>
+    <p:sldId id="257" r:id="rId3"/>
   </p:sldIdLst>
   <p:sldSz cx="12192000" cy="6858000"/>
   <p:notesSz cx="6858000" cy="9144000"/>
@@ -4420,6 +4421,1684 @@
 </p:sld>
 </file>
 
+<file path=ppt/slides/slide2.xml><?xml version="1.0" encoding="utf-8"?>
+<p:sld xmlns:a="http://schemas.openxmlformats.org/drawingml/2006/main" xmlns:r="http://schemas.openxmlformats.org/officeDocument/2006/relationships" xmlns:p="http://schemas.openxmlformats.org/presentationml/2006/main">
+  <p:cSld>
+    <p:spTree>
+      <p:nvGrpSpPr>
+        <p:cNvPr id="1" name=""/>
+        <p:cNvGrpSpPr/>
+        <p:nvPr/>
+      </p:nvGrpSpPr>
+      <p:grpSpPr>
+        <a:xfrm>
+          <a:off x="0" y="0"/>
+          <a:ext cx="0" cy="0"/>
+          <a:chOff x="0" y="0"/>
+          <a:chExt cx="0" cy="0"/>
+        </a:xfrm>
+      </p:grpSpPr>
+      <p:pic>
+        <p:nvPicPr>
+          <p:cNvPr id="3" name="Picture 2">
+            <a:extLst>
+              <a:ext uri="{FF2B5EF4-FFF2-40B4-BE49-F238E27FC236}">
+                <a16:creationId xmlns:a16="http://schemas.microsoft.com/office/drawing/2014/main" id="{EF77D9DD-E19E-2D47-AFA1-B92BFB0C6BC8}"/>
+              </a:ext>
+            </a:extLst>
+          </p:cNvPr>
+          <p:cNvPicPr>
+            <a:picLocks noChangeAspect="1"/>
+          </p:cNvPicPr>
+          <p:nvPr/>
+        </p:nvPicPr>
+        <p:blipFill>
+          <a:blip r:embed="rId2"/>
+          <a:stretch>
+            <a:fillRect/>
+          </a:stretch>
+        </p:blipFill>
+        <p:spPr>
+          <a:xfrm>
+            <a:off x="301261" y="1828800"/>
+            <a:ext cx="1609928" cy="3200400"/>
+          </a:xfrm>
+          <a:prstGeom prst="rect">
+            <a:avLst/>
+          </a:prstGeom>
+        </p:spPr>
+      </p:pic>
+      <p:sp>
+        <p:nvSpPr>
+          <p:cNvPr id="4" name="Rectangle 3">
+            <a:extLst>
+              <a:ext uri="{FF2B5EF4-FFF2-40B4-BE49-F238E27FC236}">
+                <a16:creationId xmlns:a16="http://schemas.microsoft.com/office/drawing/2014/main" id="{EB1EF05C-91B6-914B-AB5E-99560A139259}"/>
+              </a:ext>
+            </a:extLst>
+          </p:cNvPr>
+          <p:cNvSpPr/>
+          <p:nvPr/>
+        </p:nvSpPr>
+        <p:spPr>
+          <a:xfrm>
+            <a:off x="508000" y="2150533"/>
+            <a:ext cx="1202267" cy="2641600"/>
+          </a:xfrm>
+          <a:prstGeom prst="rect">
+            <a:avLst/>
+          </a:prstGeom>
+          <a:ln>
+            <a:noFill/>
+          </a:ln>
+        </p:spPr>
+        <p:style>
+          <a:lnRef idx="2">
+            <a:schemeClr val="accent6"/>
+          </a:lnRef>
+          <a:fillRef idx="1">
+            <a:schemeClr val="lt1"/>
+          </a:fillRef>
+          <a:effectRef idx="0">
+            <a:schemeClr val="accent6"/>
+          </a:effectRef>
+          <a:fontRef idx="minor">
+            <a:schemeClr val="dk1"/>
+          </a:fontRef>
+        </p:style>
+        <p:txBody>
+          <a:bodyPr rtlCol="0" anchor="ctr"/>
+          <a:lstStyle/>
+          <a:p>
+            <a:pPr algn="ctr"/>
+            <a:r>
+              <a:rPr lang="en-US" dirty="0"/>
+              <a:t>Launch-Screen</a:t>
+            </a:r>
+          </a:p>
+        </p:txBody>
+      </p:sp>
+      <p:pic>
+        <p:nvPicPr>
+          <p:cNvPr id="5" name="Picture 4">
+            <a:extLst>
+              <a:ext uri="{FF2B5EF4-FFF2-40B4-BE49-F238E27FC236}">
+                <a16:creationId xmlns:a16="http://schemas.microsoft.com/office/drawing/2014/main" id="{D5D4A3A6-AB6A-214D-8161-E4F8173390DD}"/>
+              </a:ext>
+            </a:extLst>
+          </p:cNvPr>
+          <p:cNvPicPr>
+            <a:picLocks noChangeAspect="1"/>
+          </p:cNvPicPr>
+          <p:nvPr/>
+        </p:nvPicPr>
+        <p:blipFill>
+          <a:blip r:embed="rId2"/>
+          <a:stretch>
+            <a:fillRect/>
+          </a:stretch>
+        </p:blipFill>
+        <p:spPr>
+          <a:xfrm>
+            <a:off x="5343823" y="446781"/>
+            <a:ext cx="2400936" cy="4772856"/>
+          </a:xfrm>
+          <a:prstGeom prst="rect">
+            <a:avLst/>
+          </a:prstGeom>
+        </p:spPr>
+      </p:pic>
+      <p:sp>
+        <p:nvSpPr>
+          <p:cNvPr id="6" name="Rectangle 5">
+            <a:extLst>
+              <a:ext uri="{FF2B5EF4-FFF2-40B4-BE49-F238E27FC236}">
+                <a16:creationId xmlns:a16="http://schemas.microsoft.com/office/drawing/2014/main" id="{3E43FE40-29D5-B54C-B4FA-C6449BA509CA}"/>
+              </a:ext>
+            </a:extLst>
+          </p:cNvPr>
+          <p:cNvSpPr/>
+          <p:nvPr/>
+        </p:nvSpPr>
+        <p:spPr>
+          <a:xfrm>
+            <a:off x="5486552" y="770079"/>
+            <a:ext cx="2057285" cy="4212492"/>
+          </a:xfrm>
+          <a:prstGeom prst="rect">
+            <a:avLst/>
+          </a:prstGeom>
+          <a:ln>
+            <a:noFill/>
+          </a:ln>
+        </p:spPr>
+        <p:style>
+          <a:lnRef idx="2">
+            <a:schemeClr val="accent6"/>
+          </a:lnRef>
+          <a:fillRef idx="1">
+            <a:schemeClr val="lt1"/>
+          </a:fillRef>
+          <a:effectRef idx="0">
+            <a:schemeClr val="accent6"/>
+          </a:effectRef>
+          <a:fontRef idx="minor">
+            <a:schemeClr val="dk1"/>
+          </a:fontRef>
+        </p:style>
+        <p:txBody>
+          <a:bodyPr rtlCol="0" anchor="t"/>
+          <a:lstStyle/>
+          <a:p>
+            <a:pPr algn="ctr"/>
+            <a:r>
+              <a:rPr lang="en-US" dirty="0"/>
+              <a:t>Main-Screen</a:t>
+            </a:r>
+          </a:p>
+        </p:txBody>
+      </p:sp>
+      <p:pic>
+        <p:nvPicPr>
+          <p:cNvPr id="7" name="Picture 6">
+            <a:extLst>
+              <a:ext uri="{FF2B5EF4-FFF2-40B4-BE49-F238E27FC236}">
+                <a16:creationId xmlns:a16="http://schemas.microsoft.com/office/drawing/2014/main" id="{BCCB01D6-0FE0-1E44-8692-570BC26A3CA7}"/>
+              </a:ext>
+            </a:extLst>
+          </p:cNvPr>
+          <p:cNvPicPr>
+            <a:picLocks noChangeAspect="1"/>
+          </p:cNvPicPr>
+          <p:nvPr/>
+        </p:nvPicPr>
+        <p:blipFill>
+          <a:blip r:embed="rId2"/>
+          <a:stretch>
+            <a:fillRect/>
+          </a:stretch>
+        </p:blipFill>
+        <p:spPr>
+          <a:xfrm>
+            <a:off x="8735578" y="399237"/>
+            <a:ext cx="1609928" cy="931333"/>
+          </a:xfrm>
+          <a:prstGeom prst="rect">
+            <a:avLst/>
+          </a:prstGeom>
+        </p:spPr>
+      </p:pic>
+      <p:sp>
+        <p:nvSpPr>
+          <p:cNvPr id="8" name="Rectangle 7">
+            <a:extLst>
+              <a:ext uri="{FF2B5EF4-FFF2-40B4-BE49-F238E27FC236}">
+                <a16:creationId xmlns:a16="http://schemas.microsoft.com/office/drawing/2014/main" id="{32EE5666-B7AF-2D44-9DA5-4B9F230E5262}"/>
+              </a:ext>
+            </a:extLst>
+          </p:cNvPr>
+          <p:cNvSpPr/>
+          <p:nvPr/>
+        </p:nvSpPr>
+        <p:spPr>
+          <a:xfrm>
+            <a:off x="8939408" y="463714"/>
+            <a:ext cx="1202267" cy="738553"/>
+          </a:xfrm>
+          <a:prstGeom prst="rect">
+            <a:avLst/>
+          </a:prstGeom>
+          <a:ln>
+            <a:noFill/>
+          </a:ln>
+        </p:spPr>
+        <p:style>
+          <a:lnRef idx="2">
+            <a:schemeClr val="accent6"/>
+          </a:lnRef>
+          <a:fillRef idx="1">
+            <a:schemeClr val="lt1"/>
+          </a:fillRef>
+          <a:effectRef idx="0">
+            <a:schemeClr val="accent6"/>
+          </a:effectRef>
+          <a:fontRef idx="minor">
+            <a:schemeClr val="dk1"/>
+          </a:fontRef>
+        </p:style>
+        <p:txBody>
+          <a:bodyPr rtlCol="0" anchor="ctr"/>
+          <a:lstStyle/>
+          <a:p>
+            <a:pPr algn="ctr"/>
+            <a:r>
+              <a:rPr lang="en-US" dirty="0" err="1"/>
+              <a:t>InApp</a:t>
+            </a:r>
+            <a:r>
+              <a:rPr lang="en-US" dirty="0"/>
+              <a:t>-Store-Screen</a:t>
+            </a:r>
+          </a:p>
+        </p:txBody>
+      </p:sp>
+      <p:pic>
+        <p:nvPicPr>
+          <p:cNvPr id="9" name="Picture 8">
+            <a:extLst>
+              <a:ext uri="{FF2B5EF4-FFF2-40B4-BE49-F238E27FC236}">
+                <a16:creationId xmlns:a16="http://schemas.microsoft.com/office/drawing/2014/main" id="{6BBD80D2-8948-6C41-A280-FFE6B4448115}"/>
+              </a:ext>
+            </a:extLst>
+          </p:cNvPr>
+          <p:cNvPicPr>
+            <a:picLocks noChangeAspect="1"/>
+          </p:cNvPicPr>
+          <p:nvPr/>
+        </p:nvPicPr>
+        <p:blipFill>
+          <a:blip r:embed="rId2"/>
+          <a:stretch>
+            <a:fillRect/>
+          </a:stretch>
+        </p:blipFill>
+        <p:spPr>
+          <a:xfrm>
+            <a:off x="8732041" y="1423704"/>
+            <a:ext cx="1609928" cy="931333"/>
+          </a:xfrm>
+          <a:prstGeom prst="rect">
+            <a:avLst/>
+          </a:prstGeom>
+        </p:spPr>
+      </p:pic>
+      <p:sp>
+        <p:nvSpPr>
+          <p:cNvPr id="10" name="Rectangle 9">
+            <a:extLst>
+              <a:ext uri="{FF2B5EF4-FFF2-40B4-BE49-F238E27FC236}">
+                <a16:creationId xmlns:a16="http://schemas.microsoft.com/office/drawing/2014/main" id="{F53E54B7-EF79-7F47-9A0D-A13539B97AF1}"/>
+              </a:ext>
+            </a:extLst>
+          </p:cNvPr>
+          <p:cNvSpPr/>
+          <p:nvPr/>
+        </p:nvSpPr>
+        <p:spPr>
+          <a:xfrm>
+            <a:off x="8935871" y="1488181"/>
+            <a:ext cx="1202267" cy="738553"/>
+          </a:xfrm>
+          <a:prstGeom prst="rect">
+            <a:avLst/>
+          </a:prstGeom>
+          <a:ln>
+            <a:noFill/>
+          </a:ln>
+        </p:spPr>
+        <p:style>
+          <a:lnRef idx="2">
+            <a:schemeClr val="accent6"/>
+          </a:lnRef>
+          <a:fillRef idx="1">
+            <a:schemeClr val="lt1"/>
+          </a:fillRef>
+          <a:effectRef idx="0">
+            <a:schemeClr val="accent6"/>
+          </a:effectRef>
+          <a:fontRef idx="minor">
+            <a:schemeClr val="dk1"/>
+          </a:fontRef>
+        </p:style>
+        <p:txBody>
+          <a:bodyPr rtlCol="0" anchor="ctr"/>
+          <a:lstStyle/>
+          <a:p>
+            <a:pPr algn="ctr"/>
+            <a:r>
+              <a:rPr lang="en-US" dirty="0" err="1"/>
+              <a:t>InApp</a:t>
+            </a:r>
+            <a:r>
+              <a:rPr lang="en-US" dirty="0"/>
+              <a:t>-Offer-Screen</a:t>
+            </a:r>
+          </a:p>
+        </p:txBody>
+      </p:sp>
+      <p:pic>
+        <p:nvPicPr>
+          <p:cNvPr id="11" name="Picture 10">
+            <a:extLst>
+              <a:ext uri="{FF2B5EF4-FFF2-40B4-BE49-F238E27FC236}">
+                <a16:creationId xmlns:a16="http://schemas.microsoft.com/office/drawing/2014/main" id="{86F02FD3-A5CA-0B44-9F1B-E38C630D8CCE}"/>
+              </a:ext>
+            </a:extLst>
+          </p:cNvPr>
+          <p:cNvPicPr>
+            <a:picLocks noChangeAspect="1"/>
+          </p:cNvPicPr>
+          <p:nvPr/>
+        </p:nvPicPr>
+        <p:blipFill>
+          <a:blip r:embed="rId2"/>
+          <a:stretch>
+            <a:fillRect/>
+          </a:stretch>
+        </p:blipFill>
+        <p:spPr>
+          <a:xfrm>
+            <a:off x="8728504" y="3569030"/>
+            <a:ext cx="1609928" cy="931333"/>
+          </a:xfrm>
+          <a:prstGeom prst="rect">
+            <a:avLst/>
+          </a:prstGeom>
+        </p:spPr>
+      </p:pic>
+      <p:sp>
+        <p:nvSpPr>
+          <p:cNvPr id="12" name="Rectangle 11">
+            <a:extLst>
+              <a:ext uri="{FF2B5EF4-FFF2-40B4-BE49-F238E27FC236}">
+                <a16:creationId xmlns:a16="http://schemas.microsoft.com/office/drawing/2014/main" id="{56FFB5AA-9F91-F84D-91FE-9B13F5EFF004}"/>
+              </a:ext>
+            </a:extLst>
+          </p:cNvPr>
+          <p:cNvSpPr/>
+          <p:nvPr/>
+        </p:nvSpPr>
+        <p:spPr>
+          <a:xfrm>
+            <a:off x="8932334" y="3633507"/>
+            <a:ext cx="1202267" cy="738553"/>
+          </a:xfrm>
+          <a:prstGeom prst="rect">
+            <a:avLst/>
+          </a:prstGeom>
+          <a:ln>
+            <a:noFill/>
+          </a:ln>
+        </p:spPr>
+        <p:style>
+          <a:lnRef idx="2">
+            <a:schemeClr val="accent6"/>
+          </a:lnRef>
+          <a:fillRef idx="1">
+            <a:schemeClr val="lt1"/>
+          </a:fillRef>
+          <a:effectRef idx="0">
+            <a:schemeClr val="accent6"/>
+          </a:effectRef>
+          <a:fontRef idx="minor">
+            <a:schemeClr val="dk1"/>
+          </a:fontRef>
+        </p:style>
+        <p:txBody>
+          <a:bodyPr rtlCol="0" anchor="ctr"/>
+          <a:lstStyle/>
+          <a:p>
+            <a:pPr algn="ctr"/>
+            <a:r>
+              <a:rPr lang="en-US" dirty="0"/>
+              <a:t>Game-Center-Screen</a:t>
+            </a:r>
+          </a:p>
+        </p:txBody>
+      </p:sp>
+      <p:pic>
+        <p:nvPicPr>
+          <p:cNvPr id="13" name="Picture 12">
+            <a:extLst>
+              <a:ext uri="{FF2B5EF4-FFF2-40B4-BE49-F238E27FC236}">
+                <a16:creationId xmlns:a16="http://schemas.microsoft.com/office/drawing/2014/main" id="{A5068A3B-3B46-C140-8406-0938B6FC1566}"/>
+              </a:ext>
+            </a:extLst>
+          </p:cNvPr>
+          <p:cNvPicPr>
+            <a:picLocks noChangeAspect="1"/>
+          </p:cNvPicPr>
+          <p:nvPr/>
+        </p:nvPicPr>
+        <p:blipFill>
+          <a:blip r:embed="rId2"/>
+          <a:stretch>
+            <a:fillRect/>
+          </a:stretch>
+        </p:blipFill>
+        <p:spPr>
+          <a:xfrm>
+            <a:off x="4829510" y="5739619"/>
+            <a:ext cx="1609928" cy="931333"/>
+          </a:xfrm>
+          <a:prstGeom prst="rect">
+            <a:avLst/>
+          </a:prstGeom>
+        </p:spPr>
+      </p:pic>
+      <p:sp>
+        <p:nvSpPr>
+          <p:cNvPr id="14" name="Rectangle 13">
+            <a:extLst>
+              <a:ext uri="{FF2B5EF4-FFF2-40B4-BE49-F238E27FC236}">
+                <a16:creationId xmlns:a16="http://schemas.microsoft.com/office/drawing/2014/main" id="{61B02ED4-7B1C-5A4A-88E3-9BDD9D1535A2}"/>
+              </a:ext>
+            </a:extLst>
+          </p:cNvPr>
+          <p:cNvSpPr/>
+          <p:nvPr/>
+        </p:nvSpPr>
+        <p:spPr>
+          <a:xfrm>
+            <a:off x="5033340" y="5804096"/>
+            <a:ext cx="1202267" cy="738553"/>
+          </a:xfrm>
+          <a:prstGeom prst="rect">
+            <a:avLst/>
+          </a:prstGeom>
+          <a:ln>
+            <a:noFill/>
+          </a:ln>
+        </p:spPr>
+        <p:style>
+          <a:lnRef idx="2">
+            <a:schemeClr val="accent6"/>
+          </a:lnRef>
+          <a:fillRef idx="1">
+            <a:schemeClr val="lt1"/>
+          </a:fillRef>
+          <a:effectRef idx="0">
+            <a:schemeClr val="accent6"/>
+          </a:effectRef>
+          <a:fontRef idx="minor">
+            <a:schemeClr val="dk1"/>
+          </a:fontRef>
+        </p:style>
+        <p:txBody>
+          <a:bodyPr rtlCol="0" anchor="ctr"/>
+          <a:lstStyle/>
+          <a:p>
+            <a:pPr algn="ctr"/>
+            <a:r>
+              <a:rPr lang="en-US" dirty="0"/>
+              <a:t>Feedback-Screen</a:t>
+            </a:r>
+          </a:p>
+        </p:txBody>
+      </p:sp>
+      <p:pic>
+        <p:nvPicPr>
+          <p:cNvPr id="15" name="Picture 14">
+            <a:extLst>
+              <a:ext uri="{FF2B5EF4-FFF2-40B4-BE49-F238E27FC236}">
+                <a16:creationId xmlns:a16="http://schemas.microsoft.com/office/drawing/2014/main" id="{94C935D8-F474-0045-9C70-5B5BFCA29A12}"/>
+              </a:ext>
+            </a:extLst>
+          </p:cNvPr>
+          <p:cNvPicPr>
+            <a:picLocks noChangeAspect="1"/>
+          </p:cNvPicPr>
+          <p:nvPr/>
+        </p:nvPicPr>
+        <p:blipFill>
+          <a:blip r:embed="rId2"/>
+          <a:stretch>
+            <a:fillRect/>
+          </a:stretch>
+        </p:blipFill>
+        <p:spPr>
+          <a:xfrm>
+            <a:off x="8728504" y="2496363"/>
+            <a:ext cx="1609928" cy="931333"/>
+          </a:xfrm>
+          <a:prstGeom prst="rect">
+            <a:avLst/>
+          </a:prstGeom>
+        </p:spPr>
+      </p:pic>
+      <p:sp>
+        <p:nvSpPr>
+          <p:cNvPr id="16" name="Rectangle 15">
+            <a:extLst>
+              <a:ext uri="{FF2B5EF4-FFF2-40B4-BE49-F238E27FC236}">
+                <a16:creationId xmlns:a16="http://schemas.microsoft.com/office/drawing/2014/main" id="{F396F752-5140-4E4E-8AC4-6EDDBC13894C}"/>
+              </a:ext>
+            </a:extLst>
+          </p:cNvPr>
+          <p:cNvSpPr/>
+          <p:nvPr/>
+        </p:nvSpPr>
+        <p:spPr>
+          <a:xfrm>
+            <a:off x="8932334" y="2560840"/>
+            <a:ext cx="1202267" cy="738553"/>
+          </a:xfrm>
+          <a:prstGeom prst="rect">
+            <a:avLst/>
+          </a:prstGeom>
+          <a:ln>
+            <a:noFill/>
+          </a:ln>
+        </p:spPr>
+        <p:style>
+          <a:lnRef idx="2">
+            <a:schemeClr val="accent6"/>
+          </a:lnRef>
+          <a:fillRef idx="1">
+            <a:schemeClr val="lt1"/>
+          </a:fillRef>
+          <a:effectRef idx="0">
+            <a:schemeClr val="accent6"/>
+          </a:effectRef>
+          <a:fontRef idx="minor">
+            <a:schemeClr val="dk1"/>
+          </a:fontRef>
+        </p:style>
+        <p:txBody>
+          <a:bodyPr rtlCol="0" anchor="ctr"/>
+          <a:lstStyle/>
+          <a:p>
+            <a:pPr algn="ctr"/>
+            <a:r>
+              <a:rPr lang="en-US" dirty="0"/>
+              <a:t>Settings-Screen</a:t>
+            </a:r>
+          </a:p>
+        </p:txBody>
+      </p:sp>
+      <p:pic>
+        <p:nvPicPr>
+          <p:cNvPr id="17" name="Picture 16">
+            <a:extLst>
+              <a:ext uri="{FF2B5EF4-FFF2-40B4-BE49-F238E27FC236}">
+                <a16:creationId xmlns:a16="http://schemas.microsoft.com/office/drawing/2014/main" id="{10862795-053F-DD44-BC85-F897DA23EDB3}"/>
+              </a:ext>
+            </a:extLst>
+          </p:cNvPr>
+          <p:cNvPicPr>
+            <a:picLocks noChangeAspect="1"/>
+          </p:cNvPicPr>
+          <p:nvPr/>
+        </p:nvPicPr>
+        <p:blipFill>
+          <a:blip r:embed="rId2"/>
+          <a:stretch>
+            <a:fillRect/>
+          </a:stretch>
+        </p:blipFill>
+        <p:spPr>
+          <a:xfrm>
+            <a:off x="8732041" y="5757336"/>
+            <a:ext cx="1609928" cy="931333"/>
+          </a:xfrm>
+          <a:prstGeom prst="rect">
+            <a:avLst/>
+          </a:prstGeom>
+        </p:spPr>
+      </p:pic>
+      <p:sp>
+        <p:nvSpPr>
+          <p:cNvPr id="18" name="Rectangle 17">
+            <a:extLst>
+              <a:ext uri="{FF2B5EF4-FFF2-40B4-BE49-F238E27FC236}">
+                <a16:creationId xmlns:a16="http://schemas.microsoft.com/office/drawing/2014/main" id="{F00150D1-DEAB-6D4D-8186-2F3EA0C38818}"/>
+              </a:ext>
+            </a:extLst>
+          </p:cNvPr>
+          <p:cNvSpPr/>
+          <p:nvPr/>
+        </p:nvSpPr>
+        <p:spPr>
+          <a:xfrm>
+            <a:off x="8935871" y="5821813"/>
+            <a:ext cx="1202267" cy="738553"/>
+          </a:xfrm>
+          <a:prstGeom prst="rect">
+            <a:avLst/>
+          </a:prstGeom>
+          <a:ln>
+            <a:noFill/>
+          </a:ln>
+        </p:spPr>
+        <p:style>
+          <a:lnRef idx="2">
+            <a:schemeClr val="accent6"/>
+          </a:lnRef>
+          <a:fillRef idx="1">
+            <a:schemeClr val="lt1"/>
+          </a:fillRef>
+          <a:effectRef idx="0">
+            <a:schemeClr val="accent6"/>
+          </a:effectRef>
+          <a:fontRef idx="minor">
+            <a:schemeClr val="dk1"/>
+          </a:fontRef>
+        </p:style>
+        <p:txBody>
+          <a:bodyPr rtlCol="0" anchor="ctr"/>
+          <a:lstStyle/>
+          <a:p>
+            <a:pPr algn="ctr"/>
+            <a:r>
+              <a:rPr lang="en-US" dirty="0"/>
+              <a:t>Replay-Screen</a:t>
+            </a:r>
+          </a:p>
+        </p:txBody>
+      </p:sp>
+      <p:pic>
+        <p:nvPicPr>
+          <p:cNvPr id="19" name="Picture 18">
+            <a:extLst>
+              <a:ext uri="{FF2B5EF4-FFF2-40B4-BE49-F238E27FC236}">
+                <a16:creationId xmlns:a16="http://schemas.microsoft.com/office/drawing/2014/main" id="{5622C286-02A1-0945-BF29-B48091A46506}"/>
+              </a:ext>
+            </a:extLst>
+          </p:cNvPr>
+          <p:cNvPicPr>
+            <a:picLocks noChangeAspect="1"/>
+          </p:cNvPicPr>
+          <p:nvPr/>
+        </p:nvPicPr>
+        <p:blipFill>
+          <a:blip r:embed="rId2"/>
+          <a:stretch>
+            <a:fillRect/>
+          </a:stretch>
+        </p:blipFill>
+        <p:spPr>
+          <a:xfrm>
+            <a:off x="2750150" y="736600"/>
+            <a:ext cx="1609928" cy="931333"/>
+          </a:xfrm>
+          <a:prstGeom prst="rect">
+            <a:avLst/>
+          </a:prstGeom>
+        </p:spPr>
+      </p:pic>
+      <p:sp>
+        <p:nvSpPr>
+          <p:cNvPr id="20" name="Rectangle 19">
+            <a:extLst>
+              <a:ext uri="{FF2B5EF4-FFF2-40B4-BE49-F238E27FC236}">
+                <a16:creationId xmlns:a16="http://schemas.microsoft.com/office/drawing/2014/main" id="{BBA0EF52-4E4A-5746-A1AA-EFE9E04E090D}"/>
+              </a:ext>
+            </a:extLst>
+          </p:cNvPr>
+          <p:cNvSpPr/>
+          <p:nvPr/>
+        </p:nvSpPr>
+        <p:spPr>
+          <a:xfrm>
+            <a:off x="2953980" y="801077"/>
+            <a:ext cx="1202267" cy="738553"/>
+          </a:xfrm>
+          <a:prstGeom prst="rect">
+            <a:avLst/>
+          </a:prstGeom>
+          <a:ln>
+            <a:noFill/>
+          </a:ln>
+        </p:spPr>
+        <p:style>
+          <a:lnRef idx="2">
+            <a:schemeClr val="accent6"/>
+          </a:lnRef>
+          <a:fillRef idx="1">
+            <a:schemeClr val="lt1"/>
+          </a:fillRef>
+          <a:effectRef idx="0">
+            <a:schemeClr val="accent6"/>
+          </a:effectRef>
+          <a:fontRef idx="minor">
+            <a:schemeClr val="dk1"/>
+          </a:fontRef>
+        </p:style>
+        <p:txBody>
+          <a:bodyPr rtlCol="0" anchor="ctr"/>
+          <a:lstStyle/>
+          <a:p>
+            <a:pPr algn="ctr"/>
+            <a:r>
+              <a:rPr lang="en-US" dirty="0"/>
+              <a:t>Data-Privacy-Screen</a:t>
+            </a:r>
+          </a:p>
+        </p:txBody>
+      </p:sp>
+      <p:pic>
+        <p:nvPicPr>
+          <p:cNvPr id="21" name="Picture 20">
+            <a:extLst>
+              <a:ext uri="{FF2B5EF4-FFF2-40B4-BE49-F238E27FC236}">
+                <a16:creationId xmlns:a16="http://schemas.microsoft.com/office/drawing/2014/main" id="{35CB6140-5694-7649-B9C7-B653BE753D7C}"/>
+              </a:ext>
+            </a:extLst>
+          </p:cNvPr>
+          <p:cNvPicPr>
+            <a:picLocks noChangeAspect="1"/>
+          </p:cNvPicPr>
+          <p:nvPr/>
+        </p:nvPicPr>
+        <p:blipFill>
+          <a:blip r:embed="rId2"/>
+          <a:stretch>
+            <a:fillRect/>
+          </a:stretch>
+        </p:blipFill>
+        <p:spPr>
+          <a:xfrm>
+            <a:off x="6738873" y="5739619"/>
+            <a:ext cx="1609928" cy="931333"/>
+          </a:xfrm>
+          <a:prstGeom prst="rect">
+            <a:avLst/>
+          </a:prstGeom>
+        </p:spPr>
+      </p:pic>
+      <p:sp>
+        <p:nvSpPr>
+          <p:cNvPr id="22" name="Rectangle 21">
+            <a:extLst>
+              <a:ext uri="{FF2B5EF4-FFF2-40B4-BE49-F238E27FC236}">
+                <a16:creationId xmlns:a16="http://schemas.microsoft.com/office/drawing/2014/main" id="{B42736BC-60F2-3245-8238-588112B034CA}"/>
+              </a:ext>
+            </a:extLst>
+          </p:cNvPr>
+          <p:cNvSpPr/>
+          <p:nvPr/>
+        </p:nvSpPr>
+        <p:spPr>
+          <a:xfrm>
+            <a:off x="6942703" y="5804096"/>
+            <a:ext cx="1202267" cy="738553"/>
+          </a:xfrm>
+          <a:prstGeom prst="rect">
+            <a:avLst/>
+          </a:prstGeom>
+          <a:ln>
+            <a:noFill/>
+          </a:ln>
+        </p:spPr>
+        <p:style>
+          <a:lnRef idx="2">
+            <a:schemeClr val="accent6"/>
+          </a:lnRef>
+          <a:fillRef idx="1">
+            <a:schemeClr val="lt1"/>
+          </a:fillRef>
+          <a:effectRef idx="0">
+            <a:schemeClr val="accent6"/>
+          </a:effectRef>
+          <a:fontRef idx="minor">
+            <a:schemeClr val="dk1"/>
+          </a:fontRef>
+        </p:style>
+        <p:txBody>
+          <a:bodyPr rtlCol="0" anchor="ctr"/>
+          <a:lstStyle/>
+          <a:p>
+            <a:pPr algn="ctr"/>
+            <a:r>
+              <a:rPr lang="en-US" dirty="0"/>
+              <a:t>Video-Screen</a:t>
+            </a:r>
+          </a:p>
+        </p:txBody>
+      </p:sp>
+      <p:sp>
+        <p:nvSpPr>
+          <p:cNvPr id="23" name="Rectangle 22">
+            <a:extLst>
+              <a:ext uri="{FF2B5EF4-FFF2-40B4-BE49-F238E27FC236}">
+                <a16:creationId xmlns:a16="http://schemas.microsoft.com/office/drawing/2014/main" id="{2FCCBDF0-B35D-0A40-8043-76CE90355716}"/>
+              </a:ext>
+            </a:extLst>
+          </p:cNvPr>
+          <p:cNvSpPr/>
+          <p:nvPr/>
+        </p:nvSpPr>
+        <p:spPr>
+          <a:xfrm>
+            <a:off x="5515648" y="1432430"/>
+            <a:ext cx="2057285" cy="3219286"/>
+          </a:xfrm>
+          <a:prstGeom prst="rect">
+            <a:avLst/>
+          </a:prstGeom>
+          <a:solidFill>
+            <a:srgbClr val="0070C0"/>
+          </a:solidFill>
+          <a:ln>
+            <a:noFill/>
+          </a:ln>
+        </p:spPr>
+        <p:style>
+          <a:lnRef idx="2">
+            <a:schemeClr val="accent6"/>
+          </a:lnRef>
+          <a:fillRef idx="1">
+            <a:schemeClr val="lt1"/>
+          </a:fillRef>
+          <a:effectRef idx="0">
+            <a:schemeClr val="accent6"/>
+          </a:effectRef>
+          <a:fontRef idx="minor">
+            <a:schemeClr val="dk1"/>
+          </a:fontRef>
+        </p:style>
+        <p:txBody>
+          <a:bodyPr rtlCol="0" anchor="ctr"/>
+          <a:lstStyle/>
+          <a:p>
+            <a:pPr algn="ctr"/>
+            <a:r>
+              <a:rPr lang="en-US" dirty="0">
+                <a:solidFill>
+                  <a:schemeClr val="bg1"/>
+                </a:solidFill>
+              </a:rPr>
+              <a:t>Game-View</a:t>
+            </a:r>
+          </a:p>
+        </p:txBody>
+      </p:sp>
+      <p:pic>
+        <p:nvPicPr>
+          <p:cNvPr id="24" name="Picture 23">
+            <a:extLst>
+              <a:ext uri="{FF2B5EF4-FFF2-40B4-BE49-F238E27FC236}">
+                <a16:creationId xmlns:a16="http://schemas.microsoft.com/office/drawing/2014/main" id="{726B0D20-909C-1549-98D4-E43968D0363B}"/>
+              </a:ext>
+            </a:extLst>
+          </p:cNvPr>
+          <p:cNvPicPr>
+            <a:picLocks noChangeAspect="1"/>
+          </p:cNvPicPr>
+          <p:nvPr/>
+        </p:nvPicPr>
+        <p:blipFill>
+          <a:blip r:embed="rId2"/>
+          <a:stretch>
+            <a:fillRect/>
+          </a:stretch>
+        </p:blipFill>
+        <p:spPr>
+          <a:xfrm>
+            <a:off x="8727112" y="4641697"/>
+            <a:ext cx="1609928" cy="931333"/>
+          </a:xfrm>
+          <a:prstGeom prst="rect">
+            <a:avLst/>
+          </a:prstGeom>
+        </p:spPr>
+      </p:pic>
+      <p:sp>
+        <p:nvSpPr>
+          <p:cNvPr id="25" name="Rectangle 24">
+            <a:extLst>
+              <a:ext uri="{FF2B5EF4-FFF2-40B4-BE49-F238E27FC236}">
+                <a16:creationId xmlns:a16="http://schemas.microsoft.com/office/drawing/2014/main" id="{6425E9DA-EC23-094F-BB1D-8110AAB135C0}"/>
+              </a:ext>
+            </a:extLst>
+          </p:cNvPr>
+          <p:cNvSpPr/>
+          <p:nvPr/>
+        </p:nvSpPr>
+        <p:spPr>
+          <a:xfrm>
+            <a:off x="8930942" y="4706174"/>
+            <a:ext cx="1202267" cy="738553"/>
+          </a:xfrm>
+          <a:prstGeom prst="rect">
+            <a:avLst/>
+          </a:prstGeom>
+          <a:ln>
+            <a:noFill/>
+          </a:ln>
+        </p:spPr>
+        <p:style>
+          <a:lnRef idx="2">
+            <a:schemeClr val="accent6"/>
+          </a:lnRef>
+          <a:fillRef idx="1">
+            <a:schemeClr val="lt1"/>
+          </a:fillRef>
+          <a:effectRef idx="0">
+            <a:schemeClr val="accent6"/>
+          </a:effectRef>
+          <a:fontRef idx="minor">
+            <a:schemeClr val="dk1"/>
+          </a:fontRef>
+        </p:style>
+        <p:txBody>
+          <a:bodyPr rtlCol="0" anchor="ctr"/>
+          <a:lstStyle/>
+          <a:p>
+            <a:pPr algn="ctr"/>
+            <a:r>
+              <a:rPr lang="en-US" dirty="0"/>
+              <a:t>External-Links-Screen</a:t>
+            </a:r>
+          </a:p>
+        </p:txBody>
+      </p:sp>
+      <p:sp>
+        <p:nvSpPr>
+          <p:cNvPr id="26" name="Rectangle 25">
+            <a:extLst>
+              <a:ext uri="{FF2B5EF4-FFF2-40B4-BE49-F238E27FC236}">
+                <a16:creationId xmlns:a16="http://schemas.microsoft.com/office/drawing/2014/main" id="{3AD9B568-A4AD-8B45-B07D-1365712A4455}"/>
+              </a:ext>
+            </a:extLst>
+          </p:cNvPr>
+          <p:cNvSpPr/>
+          <p:nvPr/>
+        </p:nvSpPr>
+        <p:spPr>
+          <a:xfrm>
+            <a:off x="5498121" y="4641696"/>
+            <a:ext cx="2057285" cy="387503"/>
+          </a:xfrm>
+          <a:prstGeom prst="rect">
+            <a:avLst/>
+          </a:prstGeom>
+          <a:solidFill>
+            <a:srgbClr val="C00000"/>
+          </a:solidFill>
+          <a:ln>
+            <a:noFill/>
+          </a:ln>
+        </p:spPr>
+        <p:style>
+          <a:lnRef idx="2">
+            <a:schemeClr val="accent6"/>
+          </a:lnRef>
+          <a:fillRef idx="1">
+            <a:schemeClr val="lt1"/>
+          </a:fillRef>
+          <a:effectRef idx="0">
+            <a:schemeClr val="accent6"/>
+          </a:effectRef>
+          <a:fontRef idx="minor">
+            <a:schemeClr val="dk1"/>
+          </a:fontRef>
+        </p:style>
+        <p:txBody>
+          <a:bodyPr rtlCol="0" anchor="ctr"/>
+          <a:lstStyle/>
+          <a:p>
+            <a:pPr algn="ctr"/>
+            <a:r>
+              <a:rPr lang="en-US" dirty="0">
+                <a:solidFill>
+                  <a:schemeClr val="bg1"/>
+                </a:solidFill>
+              </a:rPr>
+              <a:t>Banner</a:t>
+            </a:r>
+          </a:p>
+        </p:txBody>
+      </p:sp>
+      <p:cxnSp>
+        <p:nvCxnSpPr>
+          <p:cNvPr id="28" name="Straight Arrow Connector 27">
+            <a:extLst>
+              <a:ext uri="{FF2B5EF4-FFF2-40B4-BE49-F238E27FC236}">
+                <a16:creationId xmlns:a16="http://schemas.microsoft.com/office/drawing/2014/main" id="{0880D17B-662C-C143-9527-81E661D828B3}"/>
+              </a:ext>
+            </a:extLst>
+          </p:cNvPr>
+          <p:cNvCxnSpPr>
+            <a:stCxn id="3" idx="3"/>
+            <a:endCxn id="19" idx="1"/>
+          </p:cNvCxnSpPr>
+          <p:nvPr/>
+        </p:nvCxnSpPr>
+        <p:spPr>
+          <a:xfrm flipV="1">
+            <a:off x="1911189" y="1202267"/>
+            <a:ext cx="838961" cy="2226733"/>
+          </a:xfrm>
+          <a:prstGeom prst="straightConnector1">
+            <a:avLst/>
+          </a:prstGeom>
+          <a:ln>
+            <a:solidFill>
+              <a:schemeClr val="accent6"/>
+            </a:solidFill>
+            <a:tailEnd type="triangle"/>
+          </a:ln>
+        </p:spPr>
+        <p:style>
+          <a:lnRef idx="1">
+            <a:schemeClr val="accent1"/>
+          </a:lnRef>
+          <a:fillRef idx="0">
+            <a:schemeClr val="accent1"/>
+          </a:fillRef>
+          <a:effectRef idx="0">
+            <a:schemeClr val="accent1"/>
+          </a:effectRef>
+          <a:fontRef idx="minor">
+            <a:schemeClr val="tx1"/>
+          </a:fontRef>
+        </p:style>
+      </p:cxnSp>
+      <p:cxnSp>
+        <p:nvCxnSpPr>
+          <p:cNvPr id="30" name="Straight Arrow Connector 29">
+            <a:extLst>
+              <a:ext uri="{FF2B5EF4-FFF2-40B4-BE49-F238E27FC236}">
+                <a16:creationId xmlns:a16="http://schemas.microsoft.com/office/drawing/2014/main" id="{52BC5F86-7B24-F14B-B49F-7CFD0CE699C6}"/>
+              </a:ext>
+            </a:extLst>
+          </p:cNvPr>
+          <p:cNvCxnSpPr>
+            <a:cxnSpLocks/>
+            <a:stCxn id="3" idx="3"/>
+            <a:endCxn id="5" idx="1"/>
+          </p:cNvCxnSpPr>
+          <p:nvPr/>
+        </p:nvCxnSpPr>
+        <p:spPr>
+          <a:xfrm flipV="1">
+            <a:off x="1911189" y="2833209"/>
+            <a:ext cx="3432634" cy="595791"/>
+          </a:xfrm>
+          <a:prstGeom prst="straightConnector1">
+            <a:avLst/>
+          </a:prstGeom>
+          <a:ln>
+            <a:solidFill>
+              <a:schemeClr val="accent6"/>
+            </a:solidFill>
+            <a:tailEnd type="triangle"/>
+          </a:ln>
+        </p:spPr>
+        <p:style>
+          <a:lnRef idx="1">
+            <a:schemeClr val="accent1"/>
+          </a:lnRef>
+          <a:fillRef idx="0">
+            <a:schemeClr val="accent1"/>
+          </a:fillRef>
+          <a:effectRef idx="0">
+            <a:schemeClr val="accent1"/>
+          </a:effectRef>
+          <a:fontRef idx="minor">
+            <a:schemeClr val="tx1"/>
+          </a:fontRef>
+        </p:style>
+      </p:cxnSp>
+      <p:cxnSp>
+        <p:nvCxnSpPr>
+          <p:cNvPr id="33" name="Straight Arrow Connector 32">
+            <a:extLst>
+              <a:ext uri="{FF2B5EF4-FFF2-40B4-BE49-F238E27FC236}">
+                <a16:creationId xmlns:a16="http://schemas.microsoft.com/office/drawing/2014/main" id="{C9A2824F-348F-E448-B675-B4A7A0C48C33}"/>
+              </a:ext>
+            </a:extLst>
+          </p:cNvPr>
+          <p:cNvCxnSpPr>
+            <a:cxnSpLocks/>
+            <a:stCxn id="19" idx="3"/>
+            <a:endCxn id="5" idx="1"/>
+          </p:cNvCxnSpPr>
+          <p:nvPr/>
+        </p:nvCxnSpPr>
+        <p:spPr>
+          <a:xfrm>
+            <a:off x="4360078" y="1202267"/>
+            <a:ext cx="983745" cy="1630942"/>
+          </a:xfrm>
+          <a:prstGeom prst="straightConnector1">
+            <a:avLst/>
+          </a:prstGeom>
+          <a:ln>
+            <a:solidFill>
+              <a:schemeClr val="accent6"/>
+            </a:solidFill>
+            <a:tailEnd type="triangle"/>
+          </a:ln>
+        </p:spPr>
+        <p:style>
+          <a:lnRef idx="1">
+            <a:schemeClr val="accent1"/>
+          </a:lnRef>
+          <a:fillRef idx="0">
+            <a:schemeClr val="accent1"/>
+          </a:fillRef>
+          <a:effectRef idx="0">
+            <a:schemeClr val="accent1"/>
+          </a:effectRef>
+          <a:fontRef idx="minor">
+            <a:schemeClr val="tx1"/>
+          </a:fontRef>
+        </p:style>
+      </p:cxnSp>
+      <p:sp>
+        <p:nvSpPr>
+          <p:cNvPr id="36" name="Rectangle 35">
+            <a:extLst>
+              <a:ext uri="{FF2B5EF4-FFF2-40B4-BE49-F238E27FC236}">
+                <a16:creationId xmlns:a16="http://schemas.microsoft.com/office/drawing/2014/main" id="{BB68EACB-BDA3-6942-9843-C5CBDFCD9EB8}"/>
+              </a:ext>
+            </a:extLst>
+          </p:cNvPr>
+          <p:cNvSpPr/>
+          <p:nvPr/>
+        </p:nvSpPr>
+        <p:spPr>
+          <a:xfrm>
+            <a:off x="5515647" y="1077030"/>
+            <a:ext cx="2057285" cy="387503"/>
+          </a:xfrm>
+          <a:prstGeom prst="rect">
+            <a:avLst/>
+          </a:prstGeom>
+          <a:solidFill>
+            <a:srgbClr val="C00000"/>
+          </a:solidFill>
+          <a:ln>
+            <a:noFill/>
+          </a:ln>
+        </p:spPr>
+        <p:style>
+          <a:lnRef idx="2">
+            <a:schemeClr val="accent6"/>
+          </a:lnRef>
+          <a:fillRef idx="1">
+            <a:schemeClr val="lt1"/>
+          </a:fillRef>
+          <a:effectRef idx="0">
+            <a:schemeClr val="accent6"/>
+          </a:effectRef>
+          <a:fontRef idx="minor">
+            <a:schemeClr val="dk1"/>
+          </a:fontRef>
+        </p:style>
+        <p:txBody>
+          <a:bodyPr rtlCol="0" anchor="ctr"/>
+          <a:lstStyle/>
+          <a:p>
+            <a:pPr algn="ctr"/>
+            <a:r>
+              <a:rPr lang="en-US" dirty="0">
+                <a:solidFill>
+                  <a:schemeClr val="bg1"/>
+                </a:solidFill>
+              </a:rPr>
+              <a:t>Menu-Buttons</a:t>
+            </a:r>
+          </a:p>
+        </p:txBody>
+      </p:sp>
+      <p:cxnSp>
+        <p:nvCxnSpPr>
+          <p:cNvPr id="37" name="Straight Arrow Connector 36">
+            <a:extLst>
+              <a:ext uri="{FF2B5EF4-FFF2-40B4-BE49-F238E27FC236}">
+                <a16:creationId xmlns:a16="http://schemas.microsoft.com/office/drawing/2014/main" id="{EEB6453F-03C9-F64C-9D2D-91AFC7BC6937}"/>
+              </a:ext>
+            </a:extLst>
+          </p:cNvPr>
+          <p:cNvCxnSpPr>
+            <a:cxnSpLocks/>
+            <a:endCxn id="13" idx="0"/>
+          </p:cNvCxnSpPr>
+          <p:nvPr/>
+        </p:nvCxnSpPr>
+        <p:spPr>
+          <a:xfrm flipH="1">
+            <a:off x="5634474" y="3335414"/>
+            <a:ext cx="909816" cy="2404205"/>
+          </a:xfrm>
+          <a:prstGeom prst="straightConnector1">
+            <a:avLst/>
+          </a:prstGeom>
+          <a:ln>
+            <a:solidFill>
+              <a:schemeClr val="accent6"/>
+            </a:solidFill>
+            <a:tailEnd type="triangle"/>
+          </a:ln>
+        </p:spPr>
+        <p:style>
+          <a:lnRef idx="1">
+            <a:schemeClr val="accent1"/>
+          </a:lnRef>
+          <a:fillRef idx="0">
+            <a:schemeClr val="accent1"/>
+          </a:fillRef>
+          <a:effectRef idx="0">
+            <a:schemeClr val="accent1"/>
+          </a:effectRef>
+          <a:fontRef idx="minor">
+            <a:schemeClr val="tx1"/>
+          </a:fontRef>
+        </p:style>
+      </p:cxnSp>
+      <p:cxnSp>
+        <p:nvCxnSpPr>
+          <p:cNvPr id="40" name="Straight Arrow Connector 39">
+            <a:extLst>
+              <a:ext uri="{FF2B5EF4-FFF2-40B4-BE49-F238E27FC236}">
+                <a16:creationId xmlns:a16="http://schemas.microsoft.com/office/drawing/2014/main" id="{1A7D86C6-A0A8-2D47-8A6C-B0324B829FA9}"/>
+              </a:ext>
+            </a:extLst>
+          </p:cNvPr>
+          <p:cNvCxnSpPr>
+            <a:cxnSpLocks/>
+            <a:endCxn id="21" idx="0"/>
+          </p:cNvCxnSpPr>
+          <p:nvPr/>
+        </p:nvCxnSpPr>
+        <p:spPr>
+          <a:xfrm>
+            <a:off x="6611893" y="3427696"/>
+            <a:ext cx="931944" cy="2311923"/>
+          </a:xfrm>
+          <a:prstGeom prst="straightConnector1">
+            <a:avLst/>
+          </a:prstGeom>
+          <a:ln>
+            <a:solidFill>
+              <a:schemeClr val="accent6"/>
+            </a:solidFill>
+            <a:tailEnd type="triangle"/>
+          </a:ln>
+        </p:spPr>
+        <p:style>
+          <a:lnRef idx="1">
+            <a:schemeClr val="accent1"/>
+          </a:lnRef>
+          <a:fillRef idx="0">
+            <a:schemeClr val="accent1"/>
+          </a:fillRef>
+          <a:effectRef idx="0">
+            <a:schemeClr val="accent1"/>
+          </a:effectRef>
+          <a:fontRef idx="minor">
+            <a:schemeClr val="tx1"/>
+          </a:fontRef>
+        </p:style>
+      </p:cxnSp>
+      <p:cxnSp>
+        <p:nvCxnSpPr>
+          <p:cNvPr id="43" name="Straight Arrow Connector 42">
+            <a:extLst>
+              <a:ext uri="{FF2B5EF4-FFF2-40B4-BE49-F238E27FC236}">
+                <a16:creationId xmlns:a16="http://schemas.microsoft.com/office/drawing/2014/main" id="{739DA530-58DF-D14E-83E6-CE94B54543D3}"/>
+              </a:ext>
+            </a:extLst>
+          </p:cNvPr>
+          <p:cNvCxnSpPr>
+            <a:cxnSpLocks/>
+            <a:endCxn id="17" idx="1"/>
+          </p:cNvCxnSpPr>
+          <p:nvPr/>
+        </p:nvCxnSpPr>
+        <p:spPr>
+          <a:xfrm>
+            <a:off x="6558264" y="1303867"/>
+            <a:ext cx="2173777" cy="4919136"/>
+          </a:xfrm>
+          <a:prstGeom prst="straightConnector1">
+            <a:avLst/>
+          </a:prstGeom>
+          <a:ln>
+            <a:solidFill>
+              <a:schemeClr val="accent6"/>
+            </a:solidFill>
+            <a:tailEnd type="triangle"/>
+          </a:ln>
+        </p:spPr>
+        <p:style>
+          <a:lnRef idx="1">
+            <a:schemeClr val="accent1"/>
+          </a:lnRef>
+          <a:fillRef idx="0">
+            <a:schemeClr val="accent1"/>
+          </a:fillRef>
+          <a:effectRef idx="0">
+            <a:schemeClr val="accent1"/>
+          </a:effectRef>
+          <a:fontRef idx="minor">
+            <a:schemeClr val="tx1"/>
+          </a:fontRef>
+        </p:style>
+      </p:cxnSp>
+      <p:cxnSp>
+        <p:nvCxnSpPr>
+          <p:cNvPr id="46" name="Straight Arrow Connector 45">
+            <a:extLst>
+              <a:ext uri="{FF2B5EF4-FFF2-40B4-BE49-F238E27FC236}">
+                <a16:creationId xmlns:a16="http://schemas.microsoft.com/office/drawing/2014/main" id="{32ECE5F7-7CAE-244B-A899-0A0586FB0926}"/>
+              </a:ext>
+            </a:extLst>
+          </p:cNvPr>
+          <p:cNvCxnSpPr>
+            <a:cxnSpLocks/>
+            <a:endCxn id="24" idx="1"/>
+          </p:cNvCxnSpPr>
+          <p:nvPr/>
+        </p:nvCxnSpPr>
+        <p:spPr>
+          <a:xfrm>
+            <a:off x="6582167" y="1270781"/>
+            <a:ext cx="2144945" cy="3836583"/>
+          </a:xfrm>
+          <a:prstGeom prst="straightConnector1">
+            <a:avLst/>
+          </a:prstGeom>
+          <a:ln>
+            <a:solidFill>
+              <a:schemeClr val="accent6"/>
+            </a:solidFill>
+            <a:tailEnd type="triangle"/>
+          </a:ln>
+        </p:spPr>
+        <p:style>
+          <a:lnRef idx="1">
+            <a:schemeClr val="accent1"/>
+          </a:lnRef>
+          <a:fillRef idx="0">
+            <a:schemeClr val="accent1"/>
+          </a:fillRef>
+          <a:effectRef idx="0">
+            <a:schemeClr val="accent1"/>
+          </a:effectRef>
+          <a:fontRef idx="minor">
+            <a:schemeClr val="tx1"/>
+          </a:fontRef>
+        </p:style>
+      </p:cxnSp>
+      <p:cxnSp>
+        <p:nvCxnSpPr>
+          <p:cNvPr id="49" name="Straight Arrow Connector 48">
+            <a:extLst>
+              <a:ext uri="{FF2B5EF4-FFF2-40B4-BE49-F238E27FC236}">
+                <a16:creationId xmlns:a16="http://schemas.microsoft.com/office/drawing/2014/main" id="{C25EE7F7-F446-694A-82FB-44941E0899B9}"/>
+              </a:ext>
+            </a:extLst>
+          </p:cNvPr>
+          <p:cNvCxnSpPr>
+            <a:cxnSpLocks/>
+            <a:endCxn id="24" idx="1"/>
+          </p:cNvCxnSpPr>
+          <p:nvPr/>
+        </p:nvCxnSpPr>
+        <p:spPr>
+          <a:xfrm>
+            <a:off x="6515194" y="4858172"/>
+            <a:ext cx="2211918" cy="249192"/>
+          </a:xfrm>
+          <a:prstGeom prst="straightConnector1">
+            <a:avLst/>
+          </a:prstGeom>
+          <a:ln>
+            <a:solidFill>
+              <a:schemeClr val="accent6"/>
+            </a:solidFill>
+            <a:tailEnd type="triangle"/>
+          </a:ln>
+        </p:spPr>
+        <p:style>
+          <a:lnRef idx="1">
+            <a:schemeClr val="accent1"/>
+          </a:lnRef>
+          <a:fillRef idx="0">
+            <a:schemeClr val="accent1"/>
+          </a:fillRef>
+          <a:effectRef idx="0">
+            <a:schemeClr val="accent1"/>
+          </a:effectRef>
+          <a:fontRef idx="minor">
+            <a:schemeClr val="tx1"/>
+          </a:fontRef>
+        </p:style>
+      </p:cxnSp>
+      <p:cxnSp>
+        <p:nvCxnSpPr>
+          <p:cNvPr id="52" name="Straight Arrow Connector 51">
+            <a:extLst>
+              <a:ext uri="{FF2B5EF4-FFF2-40B4-BE49-F238E27FC236}">
+                <a16:creationId xmlns:a16="http://schemas.microsoft.com/office/drawing/2014/main" id="{83F64A13-F631-B246-909B-9EDA659F2F96}"/>
+              </a:ext>
+            </a:extLst>
+          </p:cNvPr>
+          <p:cNvCxnSpPr>
+            <a:cxnSpLocks/>
+            <a:endCxn id="11" idx="1"/>
+          </p:cNvCxnSpPr>
+          <p:nvPr/>
+        </p:nvCxnSpPr>
+        <p:spPr>
+          <a:xfrm>
+            <a:off x="6641929" y="1291096"/>
+            <a:ext cx="2086575" cy="2743601"/>
+          </a:xfrm>
+          <a:prstGeom prst="straightConnector1">
+            <a:avLst/>
+          </a:prstGeom>
+          <a:ln>
+            <a:solidFill>
+              <a:schemeClr val="accent6"/>
+            </a:solidFill>
+            <a:tailEnd type="triangle"/>
+          </a:ln>
+        </p:spPr>
+        <p:style>
+          <a:lnRef idx="1">
+            <a:schemeClr val="accent1"/>
+          </a:lnRef>
+          <a:fillRef idx="0">
+            <a:schemeClr val="accent1"/>
+          </a:fillRef>
+          <a:effectRef idx="0">
+            <a:schemeClr val="accent1"/>
+          </a:effectRef>
+          <a:fontRef idx="minor">
+            <a:schemeClr val="tx1"/>
+          </a:fontRef>
+        </p:style>
+      </p:cxnSp>
+      <p:cxnSp>
+        <p:nvCxnSpPr>
+          <p:cNvPr id="55" name="Straight Arrow Connector 54">
+            <a:extLst>
+              <a:ext uri="{FF2B5EF4-FFF2-40B4-BE49-F238E27FC236}">
+                <a16:creationId xmlns:a16="http://schemas.microsoft.com/office/drawing/2014/main" id="{A6065D22-733F-564A-A482-76D3D262BFA2}"/>
+              </a:ext>
+            </a:extLst>
+          </p:cNvPr>
+          <p:cNvCxnSpPr>
+            <a:cxnSpLocks/>
+            <a:endCxn id="15" idx="1"/>
+          </p:cNvCxnSpPr>
+          <p:nvPr/>
+        </p:nvCxnSpPr>
+        <p:spPr>
+          <a:xfrm>
+            <a:off x="6662663" y="1291096"/>
+            <a:ext cx="2065841" cy="1670934"/>
+          </a:xfrm>
+          <a:prstGeom prst="straightConnector1">
+            <a:avLst/>
+          </a:prstGeom>
+          <a:ln>
+            <a:solidFill>
+              <a:schemeClr val="accent6"/>
+            </a:solidFill>
+            <a:tailEnd type="triangle"/>
+          </a:ln>
+        </p:spPr>
+        <p:style>
+          <a:lnRef idx="1">
+            <a:schemeClr val="accent1"/>
+          </a:lnRef>
+          <a:fillRef idx="0">
+            <a:schemeClr val="accent1"/>
+          </a:fillRef>
+          <a:effectRef idx="0">
+            <a:schemeClr val="accent1"/>
+          </a:effectRef>
+          <a:fontRef idx="minor">
+            <a:schemeClr val="tx1"/>
+          </a:fontRef>
+        </p:style>
+      </p:cxnSp>
+      <p:cxnSp>
+        <p:nvCxnSpPr>
+          <p:cNvPr id="58" name="Straight Arrow Connector 57">
+            <a:extLst>
+              <a:ext uri="{FF2B5EF4-FFF2-40B4-BE49-F238E27FC236}">
+                <a16:creationId xmlns:a16="http://schemas.microsoft.com/office/drawing/2014/main" id="{78419098-272C-4945-AEA7-167CDD74F5B5}"/>
+              </a:ext>
+            </a:extLst>
+          </p:cNvPr>
+          <p:cNvCxnSpPr>
+            <a:cxnSpLocks/>
+            <a:endCxn id="9" idx="1"/>
+          </p:cNvCxnSpPr>
+          <p:nvPr/>
+        </p:nvCxnSpPr>
+        <p:spPr>
+          <a:xfrm flipV="1">
+            <a:off x="6599896" y="1889371"/>
+            <a:ext cx="2132145" cy="1426052"/>
+          </a:xfrm>
+          <a:prstGeom prst="straightConnector1">
+            <a:avLst/>
+          </a:prstGeom>
+          <a:ln>
+            <a:solidFill>
+              <a:schemeClr val="accent6"/>
+            </a:solidFill>
+            <a:tailEnd type="triangle"/>
+          </a:ln>
+        </p:spPr>
+        <p:style>
+          <a:lnRef idx="1">
+            <a:schemeClr val="accent1"/>
+          </a:lnRef>
+          <a:fillRef idx="0">
+            <a:schemeClr val="accent1"/>
+          </a:fillRef>
+          <a:effectRef idx="0">
+            <a:schemeClr val="accent1"/>
+          </a:effectRef>
+          <a:fontRef idx="minor">
+            <a:schemeClr val="tx1"/>
+          </a:fontRef>
+        </p:style>
+      </p:cxnSp>
+      <p:cxnSp>
+        <p:nvCxnSpPr>
+          <p:cNvPr id="61" name="Straight Arrow Connector 60">
+            <a:extLst>
+              <a:ext uri="{FF2B5EF4-FFF2-40B4-BE49-F238E27FC236}">
+                <a16:creationId xmlns:a16="http://schemas.microsoft.com/office/drawing/2014/main" id="{2622259E-6D05-114C-A9F0-9C806A8BEF8A}"/>
+              </a:ext>
+            </a:extLst>
+          </p:cNvPr>
+          <p:cNvCxnSpPr>
+            <a:cxnSpLocks/>
+            <a:endCxn id="7" idx="1"/>
+          </p:cNvCxnSpPr>
+          <p:nvPr/>
+        </p:nvCxnSpPr>
+        <p:spPr>
+          <a:xfrm flipV="1">
+            <a:off x="6767666" y="864904"/>
+            <a:ext cx="1967912" cy="438963"/>
+          </a:xfrm>
+          <a:prstGeom prst="straightConnector1">
+            <a:avLst/>
+          </a:prstGeom>
+          <a:ln>
+            <a:solidFill>
+              <a:schemeClr val="accent6"/>
+            </a:solidFill>
+            <a:tailEnd type="triangle"/>
+          </a:ln>
+        </p:spPr>
+        <p:style>
+          <a:lnRef idx="1">
+            <a:schemeClr val="accent1"/>
+          </a:lnRef>
+          <a:fillRef idx="0">
+            <a:schemeClr val="accent1"/>
+          </a:fillRef>
+          <a:effectRef idx="0">
+            <a:schemeClr val="accent1"/>
+          </a:effectRef>
+          <a:fontRef idx="minor">
+            <a:schemeClr val="tx1"/>
+          </a:fontRef>
+        </p:style>
+      </p:cxnSp>
+      <p:cxnSp>
+        <p:nvCxnSpPr>
+          <p:cNvPr id="68" name="Elbow Connector 67">
+            <a:extLst>
+              <a:ext uri="{FF2B5EF4-FFF2-40B4-BE49-F238E27FC236}">
+                <a16:creationId xmlns:a16="http://schemas.microsoft.com/office/drawing/2014/main" id="{41BDABC9-2FD6-2942-B0D5-07ADED7C5274}"/>
+              </a:ext>
+            </a:extLst>
+          </p:cNvPr>
+          <p:cNvCxnSpPr>
+            <a:stCxn id="9" idx="3"/>
+            <a:endCxn id="7" idx="3"/>
+          </p:cNvCxnSpPr>
+          <p:nvPr/>
+        </p:nvCxnSpPr>
+        <p:spPr>
+          <a:xfrm flipV="1">
+            <a:off x="10341969" y="864904"/>
+            <a:ext cx="3537" cy="1024467"/>
+          </a:xfrm>
+          <a:prstGeom prst="bentConnector3">
+            <a:avLst>
+              <a:gd name="adj1" fmla="val 6563104"/>
+            </a:avLst>
+          </a:prstGeom>
+          <a:ln>
+            <a:solidFill>
+              <a:schemeClr val="accent6"/>
+            </a:solidFill>
+            <a:tailEnd type="triangle"/>
+          </a:ln>
+        </p:spPr>
+        <p:style>
+          <a:lnRef idx="1">
+            <a:schemeClr val="accent1"/>
+          </a:lnRef>
+          <a:fillRef idx="0">
+            <a:schemeClr val="accent1"/>
+          </a:fillRef>
+          <a:effectRef idx="0">
+            <a:schemeClr val="accent1"/>
+          </a:effectRef>
+          <a:fontRef idx="minor">
+            <a:schemeClr val="tx1"/>
+          </a:fontRef>
+        </p:style>
+      </p:cxnSp>
+    </p:spTree>
+    <p:extLst>
+      <p:ext uri="{BB962C8B-B14F-4D97-AF65-F5344CB8AC3E}">
+        <p14:creationId xmlns:p14="http://schemas.microsoft.com/office/powerpoint/2010/main" val="2892624384"/>
+      </p:ext>
+    </p:extLst>
+  </p:cSld>
+  <p:clrMapOvr>
+    <a:masterClrMapping/>
+  </p:clrMapOvr>
+</p:sld>
+</file>
+
 <file path=ppt/theme/theme1.xml><?xml version="1.0" encoding="utf-8"?>
 <a:theme xmlns:a="http://schemas.openxmlformats.org/drawingml/2006/main" name="Office Theme">
   <a:themeElements>

</xml_diff>